<commit_message>
Lesbarkeit verbessert, gender, pdf erzeugt
</commit_message>
<xml_diff>
--- a/2_Basismodule/B6/B6.3_Programmierauftrag.pptx
+++ b/2_Basismodule/B6/B6.3_Programmierauftrag.pptx
@@ -217,7 +217,7 @@
           <a:p>
             <a:fld id="{15274189-94FE-48B0-BAE5-4E88B491242E}" type="datetimeFigureOut">
               <a:rPr lang="de-DE"/>
-              <a:t>13.10.2022</a:t>
+              <a:t>04.01.2023</a:t>
             </a:fld>
             <a:endParaRPr lang="de-DE"/>
           </a:p>
@@ -1061,7 +1061,7 @@
             <a:fld id="{BB152D9C-EC77-46BE-B6E8-C7E7925DAE68}" type="datetimeFigureOut">
               <a:rPr lang="de-DE" smtClean="0"/>
               <a:pPr/>
-              <a:t>13.10.2022</a:t>
+              <a:t>04.01.2023</a:t>
             </a:fld>
             <a:endParaRPr lang="de-DE"/>
           </a:p>
@@ -1310,7 +1310,7 @@
             <a:fld id="{BB152D9C-EC77-46BE-B6E8-C7E7925DAE68}" type="datetimeFigureOut">
               <a:rPr lang="de-DE" smtClean="0"/>
               <a:pPr/>
-              <a:t>13.10.2022</a:t>
+              <a:t>04.01.2023</a:t>
             </a:fld>
             <a:endParaRPr lang="de-DE"/>
           </a:p>
@@ -1547,7 +1547,7 @@
             <a:fld id="{BB152D9C-EC77-46BE-B6E8-C7E7925DAE68}" type="datetimeFigureOut">
               <a:rPr lang="de-DE" smtClean="0"/>
               <a:pPr/>
-              <a:t>13.10.2022</a:t>
+              <a:t>04.01.2023</a:t>
             </a:fld>
             <a:endParaRPr lang="de-DE"/>
           </a:p>
@@ -1779,7 +1779,7 @@
             <a:fld id="{BB152D9C-EC77-46BE-B6E8-C7E7925DAE68}" type="datetimeFigureOut">
               <a:rPr lang="de-DE" smtClean="0"/>
               <a:pPr/>
-              <a:t>13.10.2022</a:t>
+              <a:t>04.01.2023</a:t>
             </a:fld>
             <a:endParaRPr lang="de-DE"/>
           </a:p>
@@ -2083,7 +2083,7 @@
             <a:fld id="{BB152D9C-EC77-46BE-B6E8-C7E7925DAE68}" type="datetimeFigureOut">
               <a:rPr lang="de-DE" smtClean="0"/>
               <a:pPr/>
-              <a:t>13.10.2022</a:t>
+              <a:t>04.01.2023</a:t>
             </a:fld>
             <a:endParaRPr lang="de-DE"/>
           </a:p>
@@ -2382,7 +2382,7 @@
             <a:fld id="{BB152D9C-EC77-46BE-B6E8-C7E7925DAE68}" type="datetimeFigureOut">
               <a:rPr lang="de-DE" smtClean="0"/>
               <a:pPr/>
-              <a:t>13.10.2022</a:t>
+              <a:t>04.01.2023</a:t>
             </a:fld>
             <a:endParaRPr lang="de-DE"/>
           </a:p>
@@ -2805,7 +2805,7 @@
             <a:fld id="{BB152D9C-EC77-46BE-B6E8-C7E7925DAE68}" type="datetimeFigureOut">
               <a:rPr lang="de-DE" smtClean="0"/>
               <a:pPr/>
-              <a:t>13.10.2022</a:t>
+              <a:t>04.01.2023</a:t>
             </a:fld>
             <a:endParaRPr lang="de-DE"/>
           </a:p>
@@ -2964,7 +2964,7 @@
             <a:fld id="{BB152D9C-EC77-46BE-B6E8-C7E7925DAE68}" type="datetimeFigureOut">
               <a:rPr lang="de-DE" smtClean="0"/>
               <a:pPr/>
-              <a:t>13.10.2022</a:t>
+              <a:t>04.01.2023</a:t>
             </a:fld>
             <a:endParaRPr lang="de-DE"/>
           </a:p>
@@ -3061,7 +3061,7 @@
             <a:fld id="{BB152D9C-EC77-46BE-B6E8-C7E7925DAE68}" type="datetimeFigureOut">
               <a:rPr lang="de-DE" smtClean="0"/>
               <a:pPr/>
-              <a:t>13.10.2022</a:t>
+              <a:t>04.01.2023</a:t>
             </a:fld>
             <a:endParaRPr lang="de-DE"/>
           </a:p>
@@ -3441,7 +3441,7 @@
             <a:fld id="{BB152D9C-EC77-46BE-B6E8-C7E7925DAE68}" type="datetimeFigureOut">
               <a:rPr lang="de-DE" smtClean="0"/>
               <a:pPr/>
-              <a:t>13.10.2022</a:t>
+              <a:t>04.01.2023</a:t>
             </a:fld>
             <a:endParaRPr lang="de-DE"/>
           </a:p>
@@ -3732,7 +3732,7 @@
             <a:fld id="{BB152D9C-EC77-46BE-B6E8-C7E7925DAE68}" type="datetimeFigureOut">
               <a:rPr lang="de-DE" smtClean="0"/>
               <a:pPr/>
-              <a:t>13.10.2022</a:t>
+              <a:t>04.01.2023</a:t>
             </a:fld>
             <a:endParaRPr lang="de-DE"/>
           </a:p>
@@ -3945,7 +3945,7 @@
             <a:fld id="{BB152D9C-EC77-46BE-B6E8-C7E7925DAE68}" type="datetimeFigureOut">
               <a:rPr lang="de-DE" smtClean="0"/>
               <a:pPr/>
-              <a:t>13.10.2022</a:t>
+              <a:t>04.01.2023</a:t>
             </a:fld>
             <a:endParaRPr lang="de-DE"/>
           </a:p>
@@ -4719,7 +4719,16 @@
             </a:pPr>
             <a:r>
               <a:rPr lang="de-DE" dirty="0"/>
-              <a:t>	Unsere Firma benötigt neue Programme für die Pausengestaltung der Mitarbeiter. Eine Umfrage ergab, dass diese möglichst kurzlebig (Pause dauert max. 15 Minuten) und mit einem Mikrocontroller steuerbar sein sollten. </a:t>
+              <a:t>	Unsere Firma benötigt neue Programme für die Pausengestaltung der Beschäftigten.  Eine Pause dauert max. 15 Minuten.</a:t>
+            </a:r>
+          </a:p>
+          <a:p>
+            <a:pPr>
+              <a:buNone/>
+            </a:pPr>
+            <a:r>
+              <a:rPr lang="de-DE" dirty="0"/>
+              <a:t>	Eine Umfrage ergab, dass diese möglichst kurzlebig und mit einem Mikrocontroller steuerbar sein sollten. </a:t>
             </a:r>
           </a:p>
           <a:p>
@@ -4734,7 +4743,7 @@
             </a:pPr>
             <a:r>
               <a:rPr lang="de-DE" b="1" dirty="0"/>
-              <a:t>	Jetzt seid ihr die Softwareentwickler!</a:t>
+              <a:t>	Jetzt seid ihr die Softwareentwickler*innen!</a:t>
             </a:r>
           </a:p>
         </p:txBody>

</xml_diff>